<commit_message>
Changed "csv" in documentation to "json"
</commit_message>
<xml_diff>
--- a/doc/Mem.pptx
+++ b/doc/Mem.pptx
@@ -106,6 +106,11 @@
       </a:defRPr>
     </a:lvl9pPr>
   </p:defaultTextStyle>
+  <p:extLst>
+    <p:ext uri="{EFAFB233-063F-42B5-8137-9DF3F51BA10A}">
+      <p15:sldGuideLst xmlns:p15="http://schemas.microsoft.com/office/powerpoint/2012/main"/>
+    </p:ext>
+  </p:extLst>
 </p:presentation>
 </file>
 
@@ -3553,12 +3558,12 @@
           <a:p>
             <a:pPr algn="ctr"/>
             <a:r>
-              <a:rPr lang="en-US" b="1" dirty="0" smtClean="0">
+              <a:rPr lang="en-US" b="1" dirty="0" err="1" smtClean="0">
                 <a:solidFill>
                   <a:schemeClr val="bg1"/>
                 </a:solidFill>
               </a:rPr>
-              <a:t>Facts.csv</a:t>
+              <a:t>Facts.json</a:t>
             </a:r>
             <a:endParaRPr lang="en-US" b="1" dirty="0">
               <a:solidFill>

</xml_diff>